<commit_message>
Ajustes nos objetivos informacionais do usuário
</commit_message>
<xml_diff>
--- a/Objetivos organizacionais Usuário.pptx
+++ b/Objetivos organizacionais Usuário.pptx
@@ -154,6 +154,282 @@
 </p:presentation>
 </file>
 
+<file path=ppt/revisionInfo.xml><?xml version="1.0" encoding="utf-8"?>
+<p1510:revInfo xmlns:a="http://schemas.openxmlformats.org/drawingml/2006/main" xmlns:r="http://schemas.openxmlformats.org/officeDocument/2006/relationships" xmlns:p1510="http://schemas.microsoft.com/office/powerpoint/2015/10/main">
+  <p1510:revLst>
+    <p1510:client id="{E273B4F7-51A0-4C79-B024-9CA0048521B7}" v="1" dt="2024-03-30T17:28:30.095"/>
+  </p1510:revLst>
+</p1510:revInfo>
+</file>
+
+<file path=ppt/changesInfos/changesInfo1.xml><?xml version="1.0" encoding="utf-8"?>
+<pc:chgInfo xmlns:a="http://schemas.openxmlformats.org/drawingml/2006/main" xmlns:r="http://schemas.openxmlformats.org/officeDocument/2006/relationships" xmlns:ac="http://schemas.microsoft.com/office/drawing/2013/main/command" xmlns:pc="http://schemas.microsoft.com/office/powerpoint/2013/main/command">
+  <pc:docChgLst>
+    <pc:chgData name="PEDRO HENRIQUE COTERLI" userId="68986039-041c-441b-ae53-7b2944d09a48" providerId="ADAL" clId="{E273B4F7-51A0-4C79-B024-9CA0048521B7}"/>
+    <pc:docChg chg="undo custSel modSld">
+      <pc:chgData name="PEDRO HENRIQUE COTERLI" userId="68986039-041c-441b-ae53-7b2944d09a48" providerId="ADAL" clId="{E273B4F7-51A0-4C79-B024-9CA0048521B7}" dt="2024-03-30T17:28:56.528" v="111" actId="20577"/>
+      <pc:docMkLst>
+        <pc:docMk/>
+      </pc:docMkLst>
+      <pc:sldChg chg="delSp modSp mod">
+        <pc:chgData name="PEDRO HENRIQUE COTERLI" userId="68986039-041c-441b-ae53-7b2944d09a48" providerId="ADAL" clId="{E273B4F7-51A0-4C79-B024-9CA0048521B7}" dt="2024-03-30T17:26:19.721" v="30" actId="1076"/>
+        <pc:sldMkLst>
+          <pc:docMk/>
+          <pc:sldMk cId="2645284050" sldId="421"/>
+        </pc:sldMkLst>
+        <pc:spChg chg="mod">
+          <ac:chgData name="PEDRO HENRIQUE COTERLI" userId="68986039-041c-441b-ae53-7b2944d09a48" providerId="ADAL" clId="{E273B4F7-51A0-4C79-B024-9CA0048521B7}" dt="2024-03-30T17:25:13.181" v="14" actId="20577"/>
+          <ac:spMkLst>
+            <pc:docMk/>
+            <pc:sldMk cId="2645284050" sldId="421"/>
+            <ac:spMk id="4" creationId="{86C3A967-FD1C-ED61-05FD-B5C4BEE76B78}"/>
+          </ac:spMkLst>
+        </pc:spChg>
+        <pc:spChg chg="mod">
+          <ac:chgData name="PEDRO HENRIQUE COTERLI" userId="68986039-041c-441b-ae53-7b2944d09a48" providerId="ADAL" clId="{E273B4F7-51A0-4C79-B024-9CA0048521B7}" dt="2024-03-30T17:26:19.721" v="30" actId="1076"/>
+          <ac:spMkLst>
+            <pc:docMk/>
+            <pc:sldMk cId="2645284050" sldId="421"/>
+            <ac:spMk id="12" creationId="{14B56E06-06AD-7EC9-C15D-D8F616E58CAA}"/>
+          </ac:spMkLst>
+        </pc:spChg>
+        <pc:spChg chg="mod">
+          <ac:chgData name="PEDRO HENRIQUE COTERLI" userId="68986039-041c-441b-ae53-7b2944d09a48" providerId="ADAL" clId="{E273B4F7-51A0-4C79-B024-9CA0048521B7}" dt="2024-03-30T17:26:07.233" v="27" actId="1076"/>
+          <ac:spMkLst>
+            <pc:docMk/>
+            <pc:sldMk cId="2645284050" sldId="421"/>
+            <ac:spMk id="17" creationId="{776DE684-1067-47A6-266B-D6EAD4322DA0}"/>
+          </ac:spMkLst>
+        </pc:spChg>
+        <pc:spChg chg="mod">
+          <ac:chgData name="PEDRO HENRIQUE COTERLI" userId="68986039-041c-441b-ae53-7b2944d09a48" providerId="ADAL" clId="{E273B4F7-51A0-4C79-B024-9CA0048521B7}" dt="2024-03-30T17:25:33.350" v="19" actId="1076"/>
+          <ac:spMkLst>
+            <pc:docMk/>
+            <pc:sldMk cId="2645284050" sldId="421"/>
+            <ac:spMk id="27" creationId="{E268FD81-798D-1CDD-DE60-FFFE6C5500BA}"/>
+          </ac:spMkLst>
+        </pc:spChg>
+        <pc:spChg chg="mod">
+          <ac:chgData name="PEDRO HENRIQUE COTERLI" userId="68986039-041c-441b-ae53-7b2944d09a48" providerId="ADAL" clId="{E273B4F7-51A0-4C79-B024-9CA0048521B7}" dt="2024-03-30T17:25:37.433" v="20" actId="1076"/>
+          <ac:spMkLst>
+            <pc:docMk/>
+            <pc:sldMk cId="2645284050" sldId="421"/>
+            <ac:spMk id="28" creationId="{DBD7A1D8-5581-6371-1280-AF54727551A3}"/>
+          </ac:spMkLst>
+        </pc:spChg>
+        <pc:spChg chg="mod">
+          <ac:chgData name="PEDRO HENRIQUE COTERLI" userId="68986039-041c-441b-ae53-7b2944d09a48" providerId="ADAL" clId="{E273B4F7-51A0-4C79-B024-9CA0048521B7}" dt="2024-03-30T17:25:47.786" v="23" actId="1076"/>
+          <ac:spMkLst>
+            <pc:docMk/>
+            <pc:sldMk cId="2645284050" sldId="421"/>
+            <ac:spMk id="73" creationId="{A8B0C7B2-A775-7E22-E2E6-98390AD7EF28}"/>
+          </ac:spMkLst>
+        </pc:spChg>
+        <pc:spChg chg="mod">
+          <ac:chgData name="PEDRO HENRIQUE COTERLI" userId="68986039-041c-441b-ae53-7b2944d09a48" providerId="ADAL" clId="{E273B4F7-51A0-4C79-B024-9CA0048521B7}" dt="2024-03-30T17:25:58.665" v="24" actId="1076"/>
+          <ac:spMkLst>
+            <pc:docMk/>
+            <pc:sldMk cId="2645284050" sldId="421"/>
+            <ac:spMk id="79" creationId="{19BD74A2-C249-3B2F-614C-64781ED91712}"/>
+          </ac:spMkLst>
+        </pc:spChg>
+        <pc:cxnChg chg="del mod">
+          <ac:chgData name="PEDRO HENRIQUE COTERLI" userId="68986039-041c-441b-ae53-7b2944d09a48" providerId="ADAL" clId="{E273B4F7-51A0-4C79-B024-9CA0048521B7}" dt="2024-03-30T17:25:22.459" v="15" actId="478"/>
+          <ac:cxnSpMkLst>
+            <pc:docMk/>
+            <pc:sldMk cId="2645284050" sldId="421"/>
+            <ac:cxnSpMk id="9" creationId="{94AD163E-37EA-C16A-44B0-9900F0FA5933}"/>
+          </ac:cxnSpMkLst>
+        </pc:cxnChg>
+        <pc:cxnChg chg="del mod">
+          <ac:chgData name="PEDRO HENRIQUE COTERLI" userId="68986039-041c-441b-ae53-7b2944d09a48" providerId="ADAL" clId="{E273B4F7-51A0-4C79-B024-9CA0048521B7}" dt="2024-03-30T17:25:23.233" v="16" actId="478"/>
+          <ac:cxnSpMkLst>
+            <pc:docMk/>
+            <pc:sldMk cId="2645284050" sldId="421"/>
+            <ac:cxnSpMk id="13" creationId="{5B83960B-6F2F-2521-CAE6-38BF6AC5768A}"/>
+          </ac:cxnSpMkLst>
+        </pc:cxnChg>
+        <pc:cxnChg chg="mod">
+          <ac:chgData name="PEDRO HENRIQUE COTERLI" userId="68986039-041c-441b-ae53-7b2944d09a48" providerId="ADAL" clId="{E273B4F7-51A0-4C79-B024-9CA0048521B7}" dt="2024-03-30T17:25:33.350" v="19" actId="1076"/>
+          <ac:cxnSpMkLst>
+            <pc:docMk/>
+            <pc:sldMk cId="2645284050" sldId="421"/>
+            <ac:cxnSpMk id="19" creationId="{EC7C3CD9-9C81-6D8B-A78B-05BDCC99BDF1}"/>
+          </ac:cxnSpMkLst>
+        </pc:cxnChg>
+        <pc:cxnChg chg="mod">
+          <ac:chgData name="PEDRO HENRIQUE COTERLI" userId="68986039-041c-441b-ae53-7b2944d09a48" providerId="ADAL" clId="{E273B4F7-51A0-4C79-B024-9CA0048521B7}" dt="2024-03-30T17:25:58.665" v="24" actId="1076"/>
+          <ac:cxnSpMkLst>
+            <pc:docMk/>
+            <pc:sldMk cId="2645284050" sldId="421"/>
+            <ac:cxnSpMk id="22" creationId="{06232685-730D-3D2A-597C-E718BE6515E1}"/>
+          </ac:cxnSpMkLst>
+        </pc:cxnChg>
+        <pc:cxnChg chg="mod">
+          <ac:chgData name="PEDRO HENRIQUE COTERLI" userId="68986039-041c-441b-ae53-7b2944d09a48" providerId="ADAL" clId="{E273B4F7-51A0-4C79-B024-9CA0048521B7}" dt="2024-03-30T17:26:01.649" v="25" actId="14100"/>
+          <ac:cxnSpMkLst>
+            <pc:docMk/>
+            <pc:sldMk cId="2645284050" sldId="421"/>
+            <ac:cxnSpMk id="43" creationId="{2D5BC342-1F5A-ABD0-9A17-8171C836FB29}"/>
+          </ac:cxnSpMkLst>
+        </pc:cxnChg>
+        <pc:cxnChg chg="mod">
+          <ac:chgData name="PEDRO HENRIQUE COTERLI" userId="68986039-041c-441b-ae53-7b2944d09a48" providerId="ADAL" clId="{E273B4F7-51A0-4C79-B024-9CA0048521B7}" dt="2024-03-30T17:26:04.273" v="26" actId="14100"/>
+          <ac:cxnSpMkLst>
+            <pc:docMk/>
+            <pc:sldMk cId="2645284050" sldId="421"/>
+            <ac:cxnSpMk id="46" creationId="{73E68633-3BDB-4F4E-84A9-4623D52B9DB3}"/>
+          </ac:cxnSpMkLst>
+        </pc:cxnChg>
+      </pc:sldChg>
+      <pc:sldChg chg="addSp delSp modSp mod">
+        <pc:chgData name="PEDRO HENRIQUE COTERLI" userId="68986039-041c-441b-ae53-7b2944d09a48" providerId="ADAL" clId="{E273B4F7-51A0-4C79-B024-9CA0048521B7}" dt="2024-03-30T17:28:56.528" v="111" actId="20577"/>
+        <pc:sldMkLst>
+          <pc:docMk/>
+          <pc:sldMk cId="2176622816" sldId="422"/>
+        </pc:sldMkLst>
+        <pc:spChg chg="add del mod">
+          <ac:chgData name="PEDRO HENRIQUE COTERLI" userId="68986039-041c-441b-ae53-7b2944d09a48" providerId="ADAL" clId="{E273B4F7-51A0-4C79-B024-9CA0048521B7}" dt="2024-03-30T17:28:08.706" v="71" actId="21"/>
+          <ac:spMkLst>
+            <pc:docMk/>
+            <pc:sldMk cId="2176622816" sldId="422"/>
+            <ac:spMk id="2" creationId="{D3FAB5D5-FFCD-E1EB-B7A3-C58FAC0A34E2}"/>
+          </ac:spMkLst>
+        </pc:spChg>
+        <pc:spChg chg="mod">
+          <ac:chgData name="PEDRO HENRIQUE COTERLI" userId="68986039-041c-441b-ae53-7b2944d09a48" providerId="ADAL" clId="{E273B4F7-51A0-4C79-B024-9CA0048521B7}" dt="2024-03-30T17:27:53.962" v="68" actId="1076"/>
+          <ac:spMkLst>
+            <pc:docMk/>
+            <pc:sldMk cId="2176622816" sldId="422"/>
+            <ac:spMk id="4" creationId="{5D4C6FB5-BE9C-937E-2F56-4A9BE357DC42}"/>
+          </ac:spMkLst>
+        </pc:spChg>
+        <pc:spChg chg="mod">
+          <ac:chgData name="PEDRO HENRIQUE COTERLI" userId="68986039-041c-441b-ae53-7b2944d09a48" providerId="ADAL" clId="{E273B4F7-51A0-4C79-B024-9CA0048521B7}" dt="2024-03-30T17:27:53.962" v="68" actId="1076"/>
+          <ac:spMkLst>
+            <pc:docMk/>
+            <pc:sldMk cId="2176622816" sldId="422"/>
+            <ac:spMk id="6" creationId="{6E369170-AE8B-16FD-8BC1-E99B95C87A8E}"/>
+          </ac:spMkLst>
+        </pc:spChg>
+        <pc:spChg chg="mod">
+          <ac:chgData name="PEDRO HENRIQUE COTERLI" userId="68986039-041c-441b-ae53-7b2944d09a48" providerId="ADAL" clId="{E273B4F7-51A0-4C79-B024-9CA0048521B7}" dt="2024-03-30T17:27:53.962" v="68" actId="1076"/>
+          <ac:spMkLst>
+            <pc:docMk/>
+            <pc:sldMk cId="2176622816" sldId="422"/>
+            <ac:spMk id="7" creationId="{F9BE9078-6F61-E847-58B7-14C49354FDDD}"/>
+          </ac:spMkLst>
+        </pc:spChg>
+        <pc:spChg chg="mod">
+          <ac:chgData name="PEDRO HENRIQUE COTERLI" userId="68986039-041c-441b-ae53-7b2944d09a48" providerId="ADAL" clId="{E273B4F7-51A0-4C79-B024-9CA0048521B7}" dt="2024-03-30T17:27:53.962" v="68" actId="1076"/>
+          <ac:spMkLst>
+            <pc:docMk/>
+            <pc:sldMk cId="2176622816" sldId="422"/>
+            <ac:spMk id="9" creationId="{FB06F326-E0EE-7740-3B15-E53C079C24D3}"/>
+          </ac:spMkLst>
+        </pc:spChg>
+        <pc:spChg chg="add del mod">
+          <ac:chgData name="PEDRO HENRIQUE COTERLI" userId="68986039-041c-441b-ae53-7b2944d09a48" providerId="ADAL" clId="{E273B4F7-51A0-4C79-B024-9CA0048521B7}" dt="2024-03-30T17:28:08.706" v="71" actId="21"/>
+          <ac:spMkLst>
+            <pc:docMk/>
+            <pc:sldMk cId="2176622816" sldId="422"/>
+            <ac:spMk id="10" creationId="{3BC0F430-30C3-0AB2-592F-9B5E95D4CD2D}"/>
+          </ac:spMkLst>
+        </pc:spChg>
+        <pc:spChg chg="add mod">
+          <ac:chgData name="PEDRO HENRIQUE COTERLI" userId="68986039-041c-441b-ae53-7b2944d09a48" providerId="ADAL" clId="{E273B4F7-51A0-4C79-B024-9CA0048521B7}" dt="2024-03-30T17:28:56.528" v="111" actId="20577"/>
+          <ac:spMkLst>
+            <pc:docMk/>
+            <pc:sldMk cId="2176622816" sldId="422"/>
+            <ac:spMk id="11" creationId="{958BA3CD-D43D-2DE2-DEBF-9BBDF88CF72F}"/>
+          </ac:spMkLst>
+        </pc:spChg>
+        <pc:spChg chg="mod">
+          <ac:chgData name="PEDRO HENRIQUE COTERLI" userId="68986039-041c-441b-ae53-7b2944d09a48" providerId="ADAL" clId="{E273B4F7-51A0-4C79-B024-9CA0048521B7}" dt="2024-03-30T17:28:26.379" v="79" actId="1076"/>
+          <ac:spMkLst>
+            <pc:docMk/>
+            <pc:sldMk cId="2176622816" sldId="422"/>
+            <ac:spMk id="17" creationId="{F58DC796-DE39-B3D7-1892-169C51C12D59}"/>
+          </ac:spMkLst>
+        </pc:spChg>
+        <pc:spChg chg="mod">
+          <ac:chgData name="PEDRO HENRIQUE COTERLI" userId="68986039-041c-441b-ae53-7b2944d09a48" providerId="ADAL" clId="{E273B4F7-51A0-4C79-B024-9CA0048521B7}" dt="2024-03-30T17:28:26.379" v="79" actId="1076"/>
+          <ac:spMkLst>
+            <pc:docMk/>
+            <pc:sldMk cId="2176622816" sldId="422"/>
+            <ac:spMk id="19" creationId="{AF2F1B97-380F-146D-3E9C-9344F73756EB}"/>
+          </ac:spMkLst>
+        </pc:spChg>
+        <pc:spChg chg="mod">
+          <ac:chgData name="PEDRO HENRIQUE COTERLI" userId="68986039-041c-441b-ae53-7b2944d09a48" providerId="ADAL" clId="{E273B4F7-51A0-4C79-B024-9CA0048521B7}" dt="2024-03-30T17:28:26.379" v="79" actId="1076"/>
+          <ac:spMkLst>
+            <pc:docMk/>
+            <pc:sldMk cId="2176622816" sldId="422"/>
+            <ac:spMk id="20" creationId="{2818EB83-6703-A669-7EDA-229AAA6D1F67}"/>
+          </ac:spMkLst>
+        </pc:spChg>
+        <pc:spChg chg="mod">
+          <ac:chgData name="PEDRO HENRIQUE COTERLI" userId="68986039-041c-441b-ae53-7b2944d09a48" providerId="ADAL" clId="{E273B4F7-51A0-4C79-B024-9CA0048521B7}" dt="2024-03-30T17:28:26.379" v="79" actId="1076"/>
+          <ac:spMkLst>
+            <pc:docMk/>
+            <pc:sldMk cId="2176622816" sldId="422"/>
+            <ac:spMk id="22" creationId="{F84B8618-F1FA-15AF-773A-B7D210BF4BC9}"/>
+          </ac:spMkLst>
+        </pc:spChg>
+        <pc:spChg chg="mod">
+          <ac:chgData name="PEDRO HENRIQUE COTERLI" userId="68986039-041c-441b-ae53-7b2944d09a48" providerId="ADAL" clId="{E273B4F7-51A0-4C79-B024-9CA0048521B7}" dt="2024-03-30T17:27:53.962" v="68" actId="1076"/>
+          <ac:spMkLst>
+            <pc:docMk/>
+            <pc:sldMk cId="2176622816" sldId="422"/>
+            <ac:spMk id="31" creationId="{0FF1FA98-AE7A-8403-73E2-D4155A22EF0D}"/>
+          </ac:spMkLst>
+        </pc:spChg>
+        <pc:spChg chg="mod">
+          <ac:chgData name="PEDRO HENRIQUE COTERLI" userId="68986039-041c-441b-ae53-7b2944d09a48" providerId="ADAL" clId="{E273B4F7-51A0-4C79-B024-9CA0048521B7}" dt="2024-03-30T17:28:26.379" v="79" actId="1076"/>
+          <ac:spMkLst>
+            <pc:docMk/>
+            <pc:sldMk cId="2176622816" sldId="422"/>
+            <ac:spMk id="33" creationId="{BACE3980-0FF4-D29D-F540-80BBA1A23971}"/>
+          </ac:spMkLst>
+        </pc:spChg>
+        <pc:cxnChg chg="mod">
+          <ac:chgData name="PEDRO HENRIQUE COTERLI" userId="68986039-041c-441b-ae53-7b2944d09a48" providerId="ADAL" clId="{E273B4F7-51A0-4C79-B024-9CA0048521B7}" dt="2024-03-30T17:27:53.962" v="68" actId="1076"/>
+          <ac:cxnSpMkLst>
+            <pc:docMk/>
+            <pc:sldMk cId="2176622816" sldId="422"/>
+            <ac:cxnSpMk id="5" creationId="{2D8DEC25-B1FF-3581-E160-52910802B74B}"/>
+          </ac:cxnSpMkLst>
+        </pc:cxnChg>
+        <pc:cxnChg chg="mod">
+          <ac:chgData name="PEDRO HENRIQUE COTERLI" userId="68986039-041c-441b-ae53-7b2944d09a48" providerId="ADAL" clId="{E273B4F7-51A0-4C79-B024-9CA0048521B7}" dt="2024-03-30T17:27:53.962" v="68" actId="1076"/>
+          <ac:cxnSpMkLst>
+            <pc:docMk/>
+            <pc:sldMk cId="2176622816" sldId="422"/>
+            <ac:cxnSpMk id="13" creationId="{BE4561CD-19B2-C7A8-DCCC-620061FFC4D6}"/>
+          </ac:cxnSpMkLst>
+        </pc:cxnChg>
+        <pc:cxnChg chg="mod">
+          <ac:chgData name="PEDRO HENRIQUE COTERLI" userId="68986039-041c-441b-ae53-7b2944d09a48" providerId="ADAL" clId="{E273B4F7-51A0-4C79-B024-9CA0048521B7}" dt="2024-03-30T17:28:26.379" v="79" actId="1076"/>
+          <ac:cxnSpMkLst>
+            <pc:docMk/>
+            <pc:sldMk cId="2176622816" sldId="422"/>
+            <ac:cxnSpMk id="18" creationId="{15BEDEDC-EE34-1393-1410-80F24AADCAE7}"/>
+          </ac:cxnSpMkLst>
+        </pc:cxnChg>
+        <pc:cxnChg chg="mod">
+          <ac:chgData name="PEDRO HENRIQUE COTERLI" userId="68986039-041c-441b-ae53-7b2944d09a48" providerId="ADAL" clId="{E273B4F7-51A0-4C79-B024-9CA0048521B7}" dt="2024-03-30T17:28:26.379" v="79" actId="1076"/>
+          <ac:cxnSpMkLst>
+            <pc:docMk/>
+            <pc:sldMk cId="2176622816" sldId="422"/>
+            <ac:cxnSpMk id="23" creationId="{EBBBE7A6-0A3B-D952-F601-A5DCD7D03F12}"/>
+          </ac:cxnSpMkLst>
+        </pc:cxnChg>
+      </pc:sldChg>
+    </pc:docChg>
+  </pc:docChgLst>
+</pc:chgInfo>
+</file>
+
 <file path=ppt/handoutMasters/handoutMaster1.xml><?xml version="1.0" encoding="utf-8"?>
 <p:handoutMaster xmlns:a="http://schemas.openxmlformats.org/drawingml/2006/main" xmlns:r="http://schemas.openxmlformats.org/officeDocument/2006/relationships" xmlns:p="http://schemas.openxmlformats.org/presentationml/2006/main">
   <p:cSld>
@@ -236,7 +512,7 @@
           <a:p>
             <a:fld id="{58B8EB65-FCB1-492D-96F1-1EEFDB36395A}" type="datetimeFigureOut">
               <a:rPr lang="en-US" smtClean="0"/>
-              <a:t>3/18/2024</a:t>
+              <a:t>3/30/2024</a:t>
             </a:fld>
             <a:endParaRPr lang="en-US"/>
           </a:p>
@@ -401,7 +677,7 @@
           <a:p>
             <a:fld id="{8272A57C-5FAA-4E66-BDD9-A79C3D547D7C}" type="datetimeFigureOut">
               <a:rPr lang="en-US" smtClean="0"/>
-              <a:t>3/18/2024</a:t>
+              <a:t>3/30/2024</a:t>
             </a:fld>
             <a:endParaRPr lang="en-US"/>
           </a:p>
@@ -5949,7 +6225,7 @@
           <a:p>
             <a:r>
               <a:rPr lang="pt-BR" dirty="0"/>
-              <a:t>Usuário: Interação com lições</a:t>
+              <a:t>Usuário: Aprender idioma</a:t>
             </a:r>
           </a:p>
         </p:txBody>
@@ -6153,49 +6429,6 @@
           </a:p>
         </p:txBody>
       </p:sp>
-      <p:cxnSp>
-        <p:nvCxnSpPr>
-          <p:cNvPr id="9" name="Conector de Seta Reta 8">
-            <a:extLst>
-              <a:ext uri="{FF2B5EF4-FFF2-40B4-BE49-F238E27FC236}">
-                <a16:creationId xmlns:a16="http://schemas.microsoft.com/office/drawing/2014/main" id="{94AD163E-37EA-C16A-44B0-9900F0FA5933}"/>
-              </a:ext>
-            </a:extLst>
-          </p:cNvPr>
-          <p:cNvCxnSpPr>
-            <a:cxnSpLocks/>
-            <a:stCxn id="7" idx="6"/>
-            <a:endCxn id="73" idx="2"/>
-          </p:cNvCxnSpPr>
-          <p:nvPr/>
-        </p:nvCxnSpPr>
-        <p:spPr>
-          <a:xfrm flipV="1">
-            <a:off x="1868712" y="2552997"/>
-            <a:ext cx="4134962" cy="625033"/>
-          </a:xfrm>
-          <a:prstGeom prst="straightConnector1">
-            <a:avLst/>
-          </a:prstGeom>
-          <a:ln>
-            <a:tailEnd type="triangle"/>
-          </a:ln>
-        </p:spPr>
-        <p:style>
-          <a:lnRef idx="1">
-            <a:schemeClr val="dk1"/>
-          </a:lnRef>
-          <a:fillRef idx="0">
-            <a:schemeClr val="dk1"/>
-          </a:fillRef>
-          <a:effectRef idx="0">
-            <a:schemeClr val="dk1"/>
-          </a:effectRef>
-          <a:fontRef idx="minor">
-            <a:schemeClr val="tx1"/>
-          </a:fontRef>
-        </p:style>
-      </p:cxnSp>
       <p:sp>
         <p:nvSpPr>
           <p:cNvPr id="12" name="CaixaDeTexto 11">
@@ -6210,8 +6443,8 @@
         </p:nvSpPr>
         <p:spPr>
           <a:xfrm>
-            <a:off x="6129154" y="1833734"/>
-            <a:ext cx="1664765" cy="276999"/>
+            <a:off x="5830909" y="1668117"/>
+            <a:ext cx="1254860" cy="276999"/>
           </a:xfrm>
           <a:prstGeom prst="rect">
             <a:avLst/>
@@ -6231,49 +6464,6 @@
           </a:p>
         </p:txBody>
       </p:sp>
-      <p:cxnSp>
-        <p:nvCxnSpPr>
-          <p:cNvPr id="13" name="Conector de Seta Reta 12">
-            <a:extLst>
-              <a:ext uri="{FF2B5EF4-FFF2-40B4-BE49-F238E27FC236}">
-                <a16:creationId xmlns:a16="http://schemas.microsoft.com/office/drawing/2014/main" id="{5B83960B-6F2F-2521-CAE6-38BF6AC5768A}"/>
-              </a:ext>
-            </a:extLst>
-          </p:cNvPr>
-          <p:cNvCxnSpPr>
-            <a:cxnSpLocks/>
-            <a:stCxn id="7" idx="6"/>
-            <a:endCxn id="79" idx="2"/>
-          </p:cNvCxnSpPr>
-          <p:nvPr/>
-        </p:nvCxnSpPr>
-        <p:spPr>
-          <a:xfrm>
-            <a:off x="1868712" y="3178030"/>
-            <a:ext cx="4134962" cy="656602"/>
-          </a:xfrm>
-          <a:prstGeom prst="straightConnector1">
-            <a:avLst/>
-          </a:prstGeom>
-          <a:ln>
-            <a:tailEnd type="triangle"/>
-          </a:ln>
-        </p:spPr>
-        <p:style>
-          <a:lnRef idx="1">
-            <a:schemeClr val="dk1"/>
-          </a:lnRef>
-          <a:fillRef idx="0">
-            <a:schemeClr val="dk1"/>
-          </a:fillRef>
-          <a:effectRef idx="0">
-            <a:schemeClr val="dk1"/>
-          </a:effectRef>
-          <a:fontRef idx="minor">
-            <a:schemeClr val="tx1"/>
-          </a:fontRef>
-        </p:style>
-      </p:cxnSp>
       <p:sp>
         <p:nvSpPr>
           <p:cNvPr id="17" name="CaixaDeTexto 16">
@@ -6288,7 +6478,7 @@
         </p:nvSpPr>
         <p:spPr>
           <a:xfrm>
-            <a:off x="6129154" y="4279206"/>
+            <a:off x="5625957" y="4167760"/>
             <a:ext cx="1664765" cy="276999"/>
           </a:xfrm>
           <a:prstGeom prst="rect">
@@ -6321,14 +6511,14 @@
           <p:cNvCxnSpPr>
             <a:cxnSpLocks/>
             <a:stCxn id="7" idx="6"/>
-            <a:endCxn id="27" idx="1"/>
+            <a:endCxn id="27" idx="2"/>
           </p:cNvCxnSpPr>
           <p:nvPr/>
         </p:nvCxnSpPr>
         <p:spPr>
-          <a:xfrm>
-            <a:off x="1868712" y="3178030"/>
-            <a:ext cx="2069156" cy="1329074"/>
+          <a:xfrm flipV="1">
+            <a:off x="1868712" y="3176938"/>
+            <a:ext cx="1901404" cy="1092"/>
           </a:xfrm>
           <a:prstGeom prst="straightConnector1">
             <a:avLst/>
@@ -6370,8 +6560,8 @@
         </p:nvCxnSpPr>
         <p:spPr>
           <a:xfrm>
-            <a:off x="6426150" y="2940748"/>
-            <a:ext cx="0" cy="506132"/>
+            <a:off x="6458340" y="2778806"/>
+            <a:ext cx="0" cy="514505"/>
           </a:xfrm>
           <a:prstGeom prst="line">
             <a:avLst/>
@@ -6411,7 +6601,7 @@
         </p:nvSpPr>
         <p:spPr>
           <a:xfrm>
-            <a:off x="3844639" y="4415570"/>
+            <a:off x="3770116" y="2864421"/>
             <a:ext cx="636607" cy="625033"/>
           </a:xfrm>
           <a:prstGeom prst="ellipse">
@@ -6477,7 +6667,7 @@
         </p:nvSpPr>
         <p:spPr>
           <a:xfrm>
-            <a:off x="3364829" y="5082651"/>
+            <a:off x="3318105" y="3584077"/>
             <a:ext cx="1540627" cy="276999"/>
           </a:xfrm>
           <a:prstGeom prst="rect">
@@ -6509,15 +6699,15 @@
           </p:cNvPr>
           <p:cNvCxnSpPr>
             <a:cxnSpLocks/>
-            <a:stCxn id="27" idx="7"/>
-            <a:endCxn id="73" idx="3"/>
+            <a:stCxn id="27" idx="6"/>
+            <a:endCxn id="73" idx="2"/>
           </p:cNvCxnSpPr>
           <p:nvPr/>
         </p:nvCxnSpPr>
         <p:spPr>
           <a:xfrm flipV="1">
-            <a:off x="4388017" y="2827178"/>
-            <a:ext cx="1739397" cy="1679926"/>
+            <a:off x="4406723" y="2391055"/>
+            <a:ext cx="1629141" cy="785883"/>
           </a:xfrm>
           <a:prstGeom prst="straightConnector1">
             <a:avLst/>
@@ -6552,15 +6742,15 @@
           </p:cNvPr>
           <p:cNvCxnSpPr>
             <a:cxnSpLocks/>
-            <a:stCxn id="27" idx="7"/>
-            <a:endCxn id="79" idx="3"/>
+            <a:stCxn id="27" idx="6"/>
+            <a:endCxn id="79" idx="2"/>
           </p:cNvCxnSpPr>
           <p:nvPr/>
         </p:nvCxnSpPr>
         <p:spPr>
-          <a:xfrm flipV="1">
-            <a:off x="4388017" y="4108813"/>
-            <a:ext cx="1739397" cy="398291"/>
+          <a:xfrm>
+            <a:off x="4406723" y="3176938"/>
+            <a:ext cx="1629141" cy="504125"/>
           </a:xfrm>
           <a:prstGeom prst="straightConnector1">
             <a:avLst/>
@@ -6598,7 +6788,7 @@
         </p:nvSpPr>
         <p:spPr>
           <a:xfrm>
-            <a:off x="6003674" y="2165245"/>
+            <a:off x="6035864" y="2003303"/>
             <a:ext cx="844952" cy="775503"/>
           </a:xfrm>
           <a:prstGeom prst="donut">
@@ -6666,7 +6856,7 @@
         </p:nvSpPr>
         <p:spPr>
           <a:xfrm>
-            <a:off x="6003674" y="3446880"/>
+            <a:off x="6035864" y="3293311"/>
             <a:ext cx="844952" cy="775503"/>
           </a:xfrm>
           <a:prstGeom prst="donut">
@@ -6768,8 +6958,8 @@
         </p:nvSpPr>
         <p:spPr>
           <a:xfrm>
-            <a:off x="457200" y="685800"/>
-            <a:ext cx="4409268" cy="1228028"/>
+            <a:off x="457199" y="685800"/>
+            <a:ext cx="4946073" cy="625033"/>
           </a:xfrm>
         </p:spPr>
         <p:txBody>
@@ -6778,7 +6968,7 @@
           <a:p>
             <a:r>
               <a:rPr lang="pt-BR" dirty="0"/>
-              <a:t>Usuário: Outras interações</a:t>
+              <a:t>Usuário: Fazer compras na loja</a:t>
             </a:r>
           </a:p>
         </p:txBody>
@@ -6822,7 +7012,7 @@
         </p:nvSpPr>
         <p:spPr>
           <a:xfrm>
-            <a:off x="1884108" y="2235487"/>
+            <a:off x="1884108" y="1748187"/>
             <a:ext cx="238727" cy="259217"/>
           </a:xfrm>
           <a:prstGeom prst="flowChartConnector">
@@ -6885,7 +7075,7 @@
         </p:nvCxnSpPr>
         <p:spPr>
           <a:xfrm>
-            <a:off x="2122835" y="2365096"/>
+            <a:off x="2122835" y="1877796"/>
             <a:ext cx="1921969" cy="0"/>
           </a:xfrm>
           <a:prstGeom prst="straightConnector1">
@@ -6924,7 +7114,7 @@
         </p:nvSpPr>
         <p:spPr>
           <a:xfrm>
-            <a:off x="4044804" y="2052579"/>
+            <a:off x="4044804" y="1565279"/>
             <a:ext cx="636607" cy="625033"/>
           </a:xfrm>
           <a:prstGeom prst="ellipse">
@@ -6990,7 +7180,7 @@
         </p:nvSpPr>
         <p:spPr>
           <a:xfrm>
-            <a:off x="3757954" y="2804218"/>
+            <a:off x="3757954" y="2316918"/>
             <a:ext cx="1233515" cy="276999"/>
           </a:xfrm>
           <a:prstGeom prst="rect">
@@ -7025,7 +7215,7 @@
         </p:nvSpPr>
         <p:spPr>
           <a:xfrm>
-            <a:off x="5791196" y="2791928"/>
+            <a:off x="5791196" y="2304628"/>
             <a:ext cx="1614986" cy="276999"/>
           </a:xfrm>
           <a:prstGeom prst="rect">
@@ -7064,7 +7254,7 @@
         </p:nvCxnSpPr>
         <p:spPr>
           <a:xfrm>
-            <a:off x="4681411" y="2365096"/>
+            <a:off x="4681411" y="1877796"/>
             <a:ext cx="1494802" cy="3922"/>
           </a:xfrm>
           <a:prstGeom prst="straightConnector1">
@@ -7103,7 +7293,7 @@
         </p:nvSpPr>
         <p:spPr>
           <a:xfrm>
-            <a:off x="1884108" y="3472321"/>
+            <a:off x="1884108" y="4622248"/>
             <a:ext cx="238727" cy="259217"/>
           </a:xfrm>
           <a:prstGeom prst="flowChartConnector">
@@ -7166,7 +7356,7 @@
         </p:nvCxnSpPr>
         <p:spPr>
           <a:xfrm>
-            <a:off x="2122835" y="3601930"/>
+            <a:off x="2122835" y="4751857"/>
             <a:ext cx="1921969" cy="0"/>
           </a:xfrm>
           <a:prstGeom prst="straightConnector1">
@@ -7205,7 +7395,7 @@
         </p:nvSpPr>
         <p:spPr>
           <a:xfrm>
-            <a:off x="4044804" y="3289413"/>
+            <a:off x="4044804" y="4439340"/>
             <a:ext cx="636607" cy="625033"/>
           </a:xfrm>
           <a:prstGeom prst="ellipse">
@@ -7271,7 +7461,7 @@
         </p:nvSpPr>
         <p:spPr>
           <a:xfrm>
-            <a:off x="3757954" y="4041052"/>
+            <a:off x="3757954" y="5190979"/>
             <a:ext cx="1233515" cy="276999"/>
           </a:xfrm>
           <a:prstGeom prst="rect">
@@ -7306,7 +7496,7 @@
         </p:nvSpPr>
         <p:spPr>
           <a:xfrm>
-            <a:off x="5933612" y="4041052"/>
+            <a:off x="5933612" y="5190979"/>
             <a:ext cx="1353010" cy="276999"/>
           </a:xfrm>
           <a:prstGeom prst="rect">
@@ -7345,7 +7535,7 @@
         </p:nvCxnSpPr>
         <p:spPr>
           <a:xfrm flipV="1">
-            <a:off x="4681411" y="3601929"/>
+            <a:off x="4681411" y="4751856"/>
             <a:ext cx="1506230" cy="1"/>
           </a:xfrm>
           <a:prstGeom prst="straightConnector1">
@@ -7384,7 +7574,7 @@
         </p:nvSpPr>
         <p:spPr>
           <a:xfrm>
-            <a:off x="6176213" y="1981266"/>
+            <a:off x="6176213" y="1493966"/>
             <a:ext cx="844952" cy="775503"/>
           </a:xfrm>
           <a:prstGeom prst="donut">
@@ -7452,7 +7642,7 @@
         </p:nvSpPr>
         <p:spPr>
           <a:xfrm>
-            <a:off x="6187641" y="3214177"/>
+            <a:off x="6187641" y="4364104"/>
             <a:ext cx="844952" cy="775503"/>
           </a:xfrm>
           <a:prstGeom prst="donut">
@@ -7502,6 +7692,60 @@
                 <a:latin typeface="+mj-lt"/>
               </a:rPr>
               <a:t>11</a:t>
+            </a:r>
+          </a:p>
+        </p:txBody>
+      </p:sp>
+      <p:sp>
+        <p:nvSpPr>
+          <p:cNvPr id="11" name="Título 1">
+            <a:extLst>
+              <a:ext uri="{FF2B5EF4-FFF2-40B4-BE49-F238E27FC236}">
+                <a16:creationId xmlns:a16="http://schemas.microsoft.com/office/drawing/2014/main" id="{958BA3CD-D43D-2DE2-DEBF-9BBDF88CF72F}"/>
+              </a:ext>
+            </a:extLst>
+          </p:cNvPr>
+          <p:cNvSpPr txBox="1">
+            <a:spLocks/>
+          </p:cNvSpPr>
+          <p:nvPr/>
+        </p:nvSpPr>
+        <p:spPr>
+          <a:xfrm>
+            <a:off x="457198" y="3375185"/>
+            <a:ext cx="4946073" cy="625033"/>
+          </a:xfrm>
+          <a:prstGeom prst="rect">
+            <a:avLst/>
+          </a:prstGeom>
+        </p:spPr>
+        <p:txBody>
+          <a:bodyPr vert="horz" wrap="square" lIns="0" tIns="0" rIns="0" bIns="0" rtlCol="0" anchor="t">
+            <a:noAutofit/>
+          </a:bodyPr>
+          <a:lstStyle>
+            <a:lvl1pPr algn="l" defTabSz="914400" rtl="0" eaLnBrk="1" latinLnBrk="0" hangingPunct="1">
+              <a:lnSpc>
+                <a:spcPct val="95000"/>
+              </a:lnSpc>
+              <a:spcBef>
+                <a:spcPct val="0"/>
+              </a:spcBef>
+              <a:buNone/>
+              <a:defRPr sz="2800" b="1" kern="1200" spc="-150">
+                <a:solidFill>
+                  <a:schemeClr val="tx2"/>
+                </a:solidFill>
+                <a:latin typeface="+mj-lt"/>
+                <a:ea typeface="+mj-ea"/>
+                <a:cs typeface="+mj-cs"/>
+              </a:defRPr>
+            </a:lvl1pPr>
+          </a:lstStyle>
+          <a:p>
+            <a:r>
+              <a:rPr lang="pt-BR" dirty="0"/>
+              <a:t>Usuário: Ver perfil</a:t>
             </a:r>
           </a:p>
         </p:txBody>

</xml_diff>